<commit_message>
Small changes to CourseIntro.pptx
</commit_message>
<xml_diff>
--- a/Cameron_Lecture_Notes/week01-intro/CourseIntro.pptx
+++ b/Cameron_Lecture_Notes/week01-intro/CourseIntro.pptx
@@ -1029,7 +1029,7 @@
   <pc:docChgLst>
     <pc:chgData name="Cameron J" userId="3878b05aa3325a88" providerId="LiveId" clId="{693728FB-1E6C-477C-B631-4542CD9DCF50}"/>
     <pc:docChg chg="undo custSel addSld delSld modSld">
-      <pc:chgData name="Cameron J" userId="3878b05aa3325a88" providerId="LiveId" clId="{693728FB-1E6C-477C-B631-4542CD9DCF50}" dt="2024-09-01T16:49:20.884" v="3892" actId="20577"/>
+      <pc:chgData name="Cameron J" userId="3878b05aa3325a88" providerId="LiveId" clId="{693728FB-1E6C-477C-B631-4542CD9DCF50}" dt="2024-09-04T16:17:35.534" v="3914" actId="20577"/>
       <pc:docMkLst>
         <pc:docMk/>
       </pc:docMkLst>
@@ -1348,7 +1348,7 @@
         </pc:picChg>
       </pc:sldChg>
       <pc:sldChg chg="modSp mod">
-        <pc:chgData name="Cameron J" userId="3878b05aa3325a88" providerId="LiveId" clId="{693728FB-1E6C-477C-B631-4542CD9DCF50}" dt="2024-08-30T22:17:04.066" v="3584" actId="313"/>
+        <pc:chgData name="Cameron J" userId="3878b05aa3325a88" providerId="LiveId" clId="{693728FB-1E6C-477C-B631-4542CD9DCF50}" dt="2024-09-04T16:17:35.534" v="3914" actId="20577"/>
         <pc:sldMkLst>
           <pc:docMk/>
           <pc:sldMk cId="3543963479" sldId="296"/>
@@ -1370,7 +1370,7 @@
           </ac:spMkLst>
         </pc:spChg>
         <pc:graphicFrameChg chg="modGraphic">
-          <ac:chgData name="Cameron J" userId="3878b05aa3325a88" providerId="LiveId" clId="{693728FB-1E6C-477C-B631-4542CD9DCF50}" dt="2024-08-30T22:16:58.500" v="3567" actId="20577"/>
+          <ac:chgData name="Cameron J" userId="3878b05aa3325a88" providerId="LiveId" clId="{693728FB-1E6C-477C-B631-4542CD9DCF50}" dt="2024-09-04T16:17:35.534" v="3914" actId="20577"/>
           <ac:graphicFrameMkLst>
             <pc:docMk/>
             <pc:sldMk cId="3543963479" sldId="296"/>
@@ -1691,7 +1691,7 @@
           <a:p>
             <a:fld id="{09AC9D30-F937-4946-BF68-C2E8F399033D}" type="datetimeFigureOut">
               <a:rPr lang="en-US" smtClean="0"/>
-              <a:t>9/1/2024</a:t>
+              <a:t>9/4/2024</a:t>
             </a:fld>
             <a:endParaRPr lang="en-US"/>
           </a:p>
@@ -8480,7 +8480,7 @@
             <p:ph sz="quarter" idx="13"/>
             <p:extLst>
               <p:ext uri="{D42A27DB-BD31-4B8C-83A1-F6EECF244321}">
-                <p14:modId xmlns:p14="http://schemas.microsoft.com/office/powerpoint/2010/main" val="1182288749"/>
+                <p14:modId xmlns:p14="http://schemas.microsoft.com/office/powerpoint/2010/main" val="3030968698"/>
               </p:ext>
             </p:extLst>
           </p:nvPr>
@@ -8569,7 +8569,7 @@
                     <a:p>
                       <a:r>
                         <a:rPr lang="en-US" sz="2800" dirty="0"/>
-                        <a:t>Student Hours*</a:t>
+                        <a:t>Drop-In Hours*</a:t>
                       </a:r>
                     </a:p>
                   </a:txBody>
@@ -8606,7 +8606,7 @@
                       </a:pPr>
                       <a:r>
                         <a:rPr lang="en-US" sz="2800" dirty="0"/>
-                        <a:t>Email Professor and/or your TA</a:t>
+                        <a:t>Email Cameron and/or Jiaxin</a:t>
                       </a:r>
                     </a:p>
                     <a:p>

</xml_diff>